<commit_message>
notes on each slide
</commit_message>
<xml_diff>
--- a/files/icse22.pptx
+++ b/files/icse22.pptx
@@ -227,7 +227,7 @@
           <a:p>
             <a:fld id="{7765B7B4-1140-426D-80C7-5C3DF0ADCEB4}" type="datetimeFigureOut">
               <a:rPr lang="en-US" smtClean="0"/>
-              <a:t>4/9/2022</a:t>
+              <a:t>4/14/22</a:t>
             </a:fld>
             <a:endParaRPr lang="en-US"/>
           </a:p>
@@ -671,7 +671,7 @@
           <a:p>
             <a:r>
               <a:rPr lang="en-US" dirty="0"/>
-              <a:t>rq2 do </a:t>
+              <a:t>To answer Rq1, we first measure the updatability of every release note, which we compare its cosine similarity distance to all prior release notes. We then measure how much content the release note contains by the string length. </a:t>
             </a:r>
           </a:p>
         </p:txBody>
@@ -963,6 +963,73 @@
           <a:bodyPr/>
           <a:lstStyle/>
           <a:p>
+            <a:pPr marL="0" marR="0" lvl="0" indent="0" algn="l" defTabSz="914400" rtl="0" eaLnBrk="1" fontAlgn="auto" latinLnBrk="0" hangingPunct="1">
+              <a:lnSpc>
+                <a:spcPct val="100000"/>
+              </a:lnSpc>
+              <a:spcBef>
+                <a:spcPts val="0"/>
+              </a:spcBef>
+              <a:spcAft>
+                <a:spcPts val="0"/>
+              </a:spcAft>
+              <a:buClrTx/>
+              <a:buSzTx/>
+              <a:buFontTx/>
+              <a:buNone/>
+              <a:tabLst/>
+              <a:defRPr/>
+            </a:pPr>
+            <a:r>
+              <a:rPr lang="en-US" sz="1200" b="0" i="0" u="none" strike="noStrike" baseline="0" dirty="0">
+                <a:latin typeface="Calibri" panose="020F0502020204030204" pitchFamily="34" charset="0"/>
+                <a:cs typeface="Calibri" panose="020F0502020204030204" pitchFamily="34" charset="0"/>
+              </a:rPr>
+              <a:t>We build </a:t>
+            </a:r>
+            <a:r>
+              <a:rPr lang="en-US" sz="1200" dirty="0">
+                <a:solidFill>
+                  <a:srgbClr val="C00000"/>
+                </a:solidFill>
+                <a:latin typeface="Calibri" panose="020F0502020204030204" pitchFamily="34" charset="0"/>
+                <a:cs typeface="Calibri" panose="020F0502020204030204" pitchFamily="34" charset="0"/>
+              </a:rPr>
+              <a:t>6 </a:t>
+            </a:r>
+            <a:r>
+              <a:rPr lang="en-US" sz="1200" i="0" u="none" strike="noStrike" baseline="0" dirty="0">
+                <a:solidFill>
+                  <a:srgbClr val="C00000"/>
+                </a:solidFill>
+                <a:latin typeface="Calibri" panose="020F0502020204030204" pitchFamily="34" charset="0"/>
+                <a:cs typeface="Calibri" panose="020F0502020204030204" pitchFamily="34" charset="0"/>
+              </a:rPr>
+              <a:t>logistic regression models</a:t>
+            </a:r>
+            <a:r>
+              <a:rPr lang="en-US" sz="1200" i="0" u="none" strike="noStrike" baseline="0" dirty="0">
+                <a:latin typeface="Calibri" panose="020F0502020204030204" pitchFamily="34" charset="0"/>
+                <a:cs typeface="Calibri" panose="020F0502020204030204" pitchFamily="34" charset="0"/>
+              </a:rPr>
+              <a:t> on each of the 6 patterns</a:t>
+            </a:r>
+            <a:r>
+              <a:rPr lang="en-US" sz="1200" b="1" i="0" u="none" strike="noStrike" baseline="0" dirty="0">
+                <a:latin typeface="Calibri" panose="020F0502020204030204" pitchFamily="34" charset="0"/>
+                <a:cs typeface="Calibri" panose="020F0502020204030204" pitchFamily="34" charset="0"/>
+              </a:rPr>
+              <a:t> </a:t>
+            </a:r>
+            <a:r>
+              <a:rPr lang="en-US" sz="1200" b="0" i="0" u="none" strike="noStrike" baseline="0" dirty="0">
+                <a:latin typeface="Calibri" panose="020F0502020204030204" pitchFamily="34" charset="0"/>
+                <a:cs typeface="Calibri" panose="020F0502020204030204" pitchFamily="34" charset="0"/>
+              </a:rPr>
+              <a:t>to observe if certain app attributes are correlated with release note patterns. For example, we find that apps that write short and non-updating release notes often include a lot of bug keywords, and very rarely use emergency keywords. </a:t>
+            </a:r>
+          </a:p>
+          <a:p>
             <a:endParaRPr lang="en-US" dirty="0"/>
           </a:p>
         </p:txBody>
@@ -1049,13 +1116,7 @@
           <a:p>
             <a:r>
               <a:rPr lang="en-US" dirty="0"/>
-              <a:t>what is correlated with a shift in release notes. we wanted to formalize and learn about the apps. </a:t>
-            </a:r>
-          </a:p>
-          <a:p>
-            <a:r>
-              <a:rPr lang="en-US" dirty="0"/>
-              <a:t>we took a natural science approach to see if release patterns change at all. we observe they follow different patterns and have characteristics. </a:t>
+              <a:t>After building 6 models on the 6 identified patterns, we find some interesting results for each pattern. </a:t>
             </a:r>
           </a:p>
         </p:txBody>
@@ -1077,7 +1138,7 @@
           <a:p>
             <a:fld id="{F4FE2420-440E-4D53-B736-BE72874883E6}" type="slidenum">
               <a:rPr lang="en-US" smtClean="0"/>
-              <a:t>15</a:t>
+              <a:t>14</a:t>
             </a:fld>
             <a:endParaRPr lang="en-US"/>
           </a:p>
@@ -1086,7 +1147,7 @@
     </p:spTree>
     <p:extLst>
       <p:ext uri="{BB962C8B-B14F-4D97-AF65-F5344CB8AC3E}">
-        <p14:creationId xmlns:p14="http://schemas.microsoft.com/office/powerpoint/2010/main" val="4089347118"/>
+        <p14:creationId xmlns:p14="http://schemas.microsoft.com/office/powerpoint/2010/main" val="1536491611"/>
       </p:ext>
     </p:extLst>
   </p:cSld>
@@ -1140,12 +1201,15 @@
           <a:bodyPr/>
           <a:lstStyle/>
           <a:p>
-            <a:endParaRPr lang="en-US" dirty="0"/>
-          </a:p>
-          <a:p>
             <a:r>
               <a:rPr lang="en-US" dirty="0"/>
-              <a:t>we study how much a release note pattern changes based on time series analysis</a:t>
+              <a:t>what is correlated with a shift in release notes. we wanted to formalize and learn about the apps. </a:t>
+            </a:r>
+          </a:p>
+          <a:p>
+            <a:r>
+              <a:rPr lang="en-US" dirty="0"/>
+              <a:t>we took a natural science approach to see if release patterns change at all. we observe they follow different patterns and have characteristics. </a:t>
             </a:r>
           </a:p>
         </p:txBody>
@@ -1167,7 +1231,7 @@
           <a:p>
             <a:fld id="{F4FE2420-440E-4D53-B736-BE72874883E6}" type="slidenum">
               <a:rPr lang="en-US" smtClean="0"/>
-              <a:t>16</a:t>
+              <a:t>15</a:t>
             </a:fld>
             <a:endParaRPr lang="en-US"/>
           </a:p>
@@ -1176,7 +1240,7 @@
     </p:spTree>
     <p:extLst>
       <p:ext uri="{BB962C8B-B14F-4D97-AF65-F5344CB8AC3E}">
-        <p14:creationId xmlns:p14="http://schemas.microsoft.com/office/powerpoint/2010/main" val="2348628236"/>
+        <p14:creationId xmlns:p14="http://schemas.microsoft.com/office/powerpoint/2010/main" val="4089347118"/>
       </p:ext>
     </p:extLst>
   </p:cSld>
@@ -1230,15 +1294,12 @@
           <a:bodyPr/>
           <a:lstStyle/>
           <a:p>
+            <a:endParaRPr lang="en-US" dirty="0"/>
+          </a:p>
+          <a:p>
             <a:r>
               <a:rPr lang="en-US" dirty="0"/>
-              <a:t>thickness of the arrow </a:t>
-            </a:r>
-          </a:p>
-          <a:p>
-            <a:r>
-              <a:rPr lang="en-US" dirty="0"/>
-              <a:t>skip a lot of this slide </a:t>
+              <a:t>we study how much a release note pattern changes based on time series analysis</a:t>
             </a:r>
           </a:p>
         </p:txBody>
@@ -1260,7 +1321,7 @@
           <a:p>
             <a:fld id="{F4FE2420-440E-4D53-B736-BE72874883E6}" type="slidenum">
               <a:rPr lang="en-US" smtClean="0"/>
-              <a:t>17</a:t>
+              <a:t>16</a:t>
             </a:fld>
             <a:endParaRPr lang="en-US"/>
           </a:p>
@@ -1269,7 +1330,7 @@
     </p:spTree>
     <p:extLst>
       <p:ext uri="{BB962C8B-B14F-4D97-AF65-F5344CB8AC3E}">
-        <p14:creationId xmlns:p14="http://schemas.microsoft.com/office/powerpoint/2010/main" val="1817942388"/>
+        <p14:creationId xmlns:p14="http://schemas.microsoft.com/office/powerpoint/2010/main" val="2348628236"/>
       </p:ext>
     </p:extLst>
   </p:cSld>
@@ -1323,62 +1384,9 @@
           <a:bodyPr/>
           <a:lstStyle/>
           <a:p>
-            <a:endParaRPr lang="en-US" dirty="0"/>
-          </a:p>
-          <a:p>
-            <a:endParaRPr lang="en-US" dirty="0"/>
-          </a:p>
-          <a:p>
             <a:r>
               <a:rPr lang="en-US" dirty="0"/>
-              <a:t>For all the 54 apps that show a pattern shift, we read the release notes before and after its shift to see why the release notes are different. </a:t>
-            </a:r>
-          </a:p>
-          <a:p>
-            <a:endParaRPr lang="en-US" dirty="0"/>
-          </a:p>
-          <a:p>
-            <a:r>
-              <a:rPr lang="en-US" dirty="0"/>
-              <a:t>We saw that some shifts are because of apps need to teach users how to use a new feature</a:t>
-            </a:r>
-          </a:p>
-          <a:p>
-            <a:r>
-              <a:rPr lang="en-US" dirty="0"/>
-              <a:t>Address a particularly negative user feedback, talk about a big fixes or UI changes that might confuse users.</a:t>
-            </a:r>
-          </a:p>
-          <a:p>
-            <a:r>
-              <a:rPr lang="en-US" dirty="0"/>
-              <a:t>Sometimes they change patterns because google play store has a service update so they have to mention it in subsequent release notes.</a:t>
-            </a:r>
-          </a:p>
-          <a:p>
-            <a:endParaRPr lang="en-US" dirty="0"/>
-          </a:p>
-          <a:p>
-            <a:r>
-              <a:rPr lang="en-US" dirty="0"/>
-              <a:t>And the last two are fun! Sometimes </a:t>
-            </a:r>
-            <a:r>
-              <a:rPr lang="en-US" dirty="0" err="1"/>
-              <a:t>devs</a:t>
-            </a:r>
-            <a:r>
-              <a:rPr lang="en-US" dirty="0"/>
-              <a:t> just include a fun holiday release note or make jokes about the new updates. </a:t>
-            </a:r>
-          </a:p>
-          <a:p>
-            <a:endParaRPr lang="en-US" dirty="0"/>
-          </a:p>
-          <a:p>
-            <a:r>
-              <a:rPr lang="en-US" dirty="0"/>
-              <a:t>One important finding we saw was that in one particular shift, pattern 1 to pattern 5, which goes from short and never updating release notes to long and updating release notes show a 94% higher average rating AFTER the shift. So developers writing descriptive and updating release notes does see a correlation with users enjoying the app more!</a:t>
+              <a:t>We observe that 92% of the identified shifts are either from short to long or non-updating to updating release notes. As you can see from the figure on the right, 16 of the 54 shifting apps go from using short non-updating release notes to long and updating release notes. </a:t>
             </a:r>
           </a:p>
         </p:txBody>
@@ -1400,7 +1408,7 @@
           <a:p>
             <a:fld id="{F4FE2420-440E-4D53-B736-BE72874883E6}" type="slidenum">
               <a:rPr lang="en-US" smtClean="0"/>
-              <a:t>18</a:t>
+              <a:t>17</a:t>
             </a:fld>
             <a:endParaRPr lang="en-US"/>
           </a:p>
@@ -1409,7 +1417,7 @@
     </p:spTree>
     <p:extLst>
       <p:ext uri="{BB962C8B-B14F-4D97-AF65-F5344CB8AC3E}">
-        <p14:creationId xmlns:p14="http://schemas.microsoft.com/office/powerpoint/2010/main" val="2020759122"/>
+        <p14:creationId xmlns:p14="http://schemas.microsoft.com/office/powerpoint/2010/main" val="1817942388"/>
       </p:ext>
     </p:extLst>
   </p:cSld>
@@ -1463,15 +1471,149 @@
           <a:bodyPr/>
           <a:lstStyle/>
           <a:p>
+            <a:endParaRPr lang="en-US" dirty="0"/>
+          </a:p>
+          <a:p>
+            <a:endParaRPr lang="en-US" dirty="0"/>
+          </a:p>
+          <a:p>
             <a:r>
               <a:rPr lang="en-US" dirty="0"/>
-              <a:t>make more clear imperfect release notes. there is something interesting with release notes. no-one has done this before dig into it. </a:t>
-            </a:r>
+              <a:t>For all the 54 apps that show a pattern shift, we read the release notes before and after its shift to see why the release notes are different. </a:t>
+            </a:r>
+          </a:p>
+          <a:p>
+            <a:endParaRPr lang="en-US" dirty="0"/>
           </a:p>
           <a:p>
             <a:r>
               <a:rPr lang="en-US" dirty="0"/>
-              <a:t>it seems there are correlations with updated</a:t>
+              <a:t>We saw that some shifts are because of apps need to teach users how to use a new feature</a:t>
+            </a:r>
+          </a:p>
+          <a:p>
+            <a:r>
+              <a:rPr lang="en-US" dirty="0"/>
+              <a:t>Address a particularly negative user feedback, talk about a big fixes or UI changes that might confuse users.</a:t>
+            </a:r>
+          </a:p>
+          <a:p>
+            <a:r>
+              <a:rPr lang="en-US" dirty="0"/>
+              <a:t>Sometimes they change patterns because google play store has a service update so they have to mention it in subsequent release notes.</a:t>
+            </a:r>
+          </a:p>
+          <a:p>
+            <a:endParaRPr lang="en-US" dirty="0"/>
+          </a:p>
+          <a:p>
+            <a:r>
+              <a:rPr lang="en-US" dirty="0"/>
+              <a:t>And the last two are fun! Sometimes </a:t>
+            </a:r>
+            <a:r>
+              <a:rPr lang="en-US" dirty="0" err="1"/>
+              <a:t>devs</a:t>
+            </a:r>
+            <a:r>
+              <a:rPr lang="en-US" dirty="0"/>
+              <a:t> just include a fun holiday release note or make jokes about the new updates. </a:t>
+            </a:r>
+          </a:p>
+          <a:p>
+            <a:endParaRPr lang="en-US" dirty="0"/>
+          </a:p>
+          <a:p>
+            <a:r>
+              <a:rPr lang="en-US" dirty="0"/>
+              <a:t>One important finding we saw was that in one particular shift, pattern 1 to pattern 5, which goes from short and never updating release notes to long and updating release notes show a 94% higher average rating AFTER the shift. So developers writing descriptive and updating release notes does see a correlation with users enjoying the app more!</a:t>
+            </a:r>
+          </a:p>
+        </p:txBody>
+      </p:sp>
+      <p:sp>
+        <p:nvSpPr>
+          <p:cNvPr id="4" name="Slide Number Placeholder 3"/>
+          <p:cNvSpPr>
+            <a:spLocks noGrp="1"/>
+          </p:cNvSpPr>
+          <p:nvPr>
+            <p:ph type="sldNum" sz="quarter" idx="5"/>
+          </p:nvPr>
+        </p:nvSpPr>
+        <p:spPr/>
+        <p:txBody>
+          <a:bodyPr/>
+          <a:lstStyle/>
+          <a:p>
+            <a:fld id="{F4FE2420-440E-4D53-B736-BE72874883E6}" type="slidenum">
+              <a:rPr lang="en-US" smtClean="0"/>
+              <a:t>18</a:t>
+            </a:fld>
+            <a:endParaRPr lang="en-US"/>
+          </a:p>
+        </p:txBody>
+      </p:sp>
+    </p:spTree>
+    <p:extLst>
+      <p:ext uri="{BB962C8B-B14F-4D97-AF65-F5344CB8AC3E}">
+        <p14:creationId xmlns:p14="http://schemas.microsoft.com/office/powerpoint/2010/main" val="2020759122"/>
+      </p:ext>
+    </p:extLst>
+  </p:cSld>
+  <p:clrMapOvr>
+    <a:masterClrMapping/>
+  </p:clrMapOvr>
+</p:notes>
+</file>
+
+<file path=ppt/notesSlides/notesSlide19.xml><?xml version="1.0" encoding="utf-8"?>
+<p:notes xmlns:a="http://schemas.openxmlformats.org/drawingml/2006/main" xmlns:r="http://schemas.openxmlformats.org/officeDocument/2006/relationships" xmlns:p="http://schemas.openxmlformats.org/presentationml/2006/main">
+  <p:cSld>
+    <p:spTree>
+      <p:nvGrpSpPr>
+        <p:cNvPr id="1" name=""/>
+        <p:cNvGrpSpPr/>
+        <p:nvPr/>
+      </p:nvGrpSpPr>
+      <p:grpSpPr>
+        <a:xfrm>
+          <a:off x="0" y="0"/>
+          <a:ext cx="0" cy="0"/>
+          <a:chOff x="0" y="0"/>
+          <a:chExt cx="0" cy="0"/>
+        </a:xfrm>
+      </p:grpSpPr>
+      <p:sp>
+        <p:nvSpPr>
+          <p:cNvPr id="2" name="Slide Image Placeholder 1"/>
+          <p:cNvSpPr>
+            <a:spLocks noGrp="1" noRot="1" noChangeAspect="1"/>
+          </p:cNvSpPr>
+          <p:nvPr>
+            <p:ph type="sldImg"/>
+          </p:nvPr>
+        </p:nvSpPr>
+        <p:spPr/>
+      </p:sp>
+      <p:sp>
+        <p:nvSpPr>
+          <p:cNvPr id="3" name="Notes Placeholder 2"/>
+          <p:cNvSpPr>
+            <a:spLocks noGrp="1"/>
+          </p:cNvSpPr>
+          <p:nvPr>
+            <p:ph type="body" idx="1"/>
+          </p:nvPr>
+        </p:nvSpPr>
+        <p:spPr/>
+        <p:txBody>
+          <a:bodyPr/>
+          <a:lstStyle/>
+          <a:p>
+            <a:r>
+              <a:rPr lang="en-US" dirty="0"/>
+              <a:t>To summarize this talk, we found that release notes are imperfect, and users often write negative reviews because of them. We use a developer survey study as well as a quantitative study on 3 years of google play store data to find out how release notes are written and how they can be improved. To the best of our knowledge, our work is the first to include both a qualitative study and a longitudinal study on 3 years worth of release note date. Our main contributions are the 6 identified release note patterns, and the classification model identified app characteristics correlated to these patterns. In particular, we find that apps that write long and updating release notes often have higher perceive releases, and apps that shift into writing more informative release notes often observe an increase in user ratings. </a:t>
             </a:r>
           </a:p>
         </p:txBody>
@@ -1934,7 +2076,7 @@
             </a:r>
             <a:r>
               <a:rPr lang="en-US" dirty="0"/>
-              <a:t> in a team. </a:t>
+              <a:t> in a team. Specifically, we find 15% of the surveyed developers say they work mostly on release management, and keeping release notes up to date is an important aspect of their job. So we know that at least 15% of our surveyed developers care about release notes writing. But what about the rest?</a:t>
             </a:r>
           </a:p>
         </p:txBody>
@@ -2019,7 +2161,52 @@
           <a:bodyPr/>
           <a:lstStyle/>
           <a:p>
-            <a:endParaRPr lang="en-US" dirty="0"/>
+            <a:r>
+              <a:rPr lang="en-US" dirty="0"/>
+              <a:t>When asked about if they update release notes, 67% of the surveyed developers say they try to update them at every release.</a:t>
+            </a:r>
+          </a:p>
+          <a:p>
+            <a:pPr marL="0" marR="0" lvl="0" indent="0" algn="l" defTabSz="914400" rtl="0" eaLnBrk="1" fontAlgn="auto" latinLnBrk="0" hangingPunct="1">
+              <a:lnSpc>
+                <a:spcPct val="100000"/>
+              </a:lnSpc>
+              <a:spcBef>
+                <a:spcPts val="0"/>
+              </a:spcBef>
+              <a:spcAft>
+                <a:spcPts val="0"/>
+              </a:spcAft>
+              <a:buClrTx/>
+              <a:buSzTx/>
+              <a:buFontTx/>
+              <a:buNone/>
+              <a:tabLst/>
+              <a:defRPr/>
+            </a:pPr>
+            <a:r>
+              <a:rPr lang="en-US" dirty="0"/>
+              <a:t>78% of them would like a tool to help them generate release notes.</a:t>
+            </a:r>
+            <a:br>
+              <a:rPr lang="en-US" dirty="0"/>
+            </a:br>
+            <a:r>
+              <a:rPr lang="en-US" dirty="0"/>
+              <a:t>83% of the developers also think that release notes can directly respond to users, and </a:t>
+            </a:r>
+          </a:p>
+          <a:p>
+            <a:r>
+              <a:rPr lang="en-US" dirty="0"/>
+              <a:t>90% of the developers say that they are important for notifying the userbase about recent updates to their app. Only 1% think that release notes are not useful for </a:t>
+            </a:r>
+          </a:p>
+          <a:p>
+            <a:r>
+              <a:rPr lang="en-US" dirty="0"/>
+              <a:t>updating the user-base.</a:t>
+            </a:r>
           </a:p>
         </p:txBody>
       </p:sp>
@@ -2105,7 +2292,7 @@
           <a:p>
             <a:r>
               <a:rPr lang="en-US" dirty="0"/>
-              <a:t>Now that we have some survey results, we want to use the data available from existing apps to see if we can identify patterns from release notes. If there are patterns, maybe I can use these patterns to identify app behaviors correlated to those patterns. </a:t>
+              <a:t>Now that we have some survey results, we want to see if data from the top 2000 apps on the google play store support the surveyed developers’ responses. We also want to use the data available from existing apps to see if we can identify patterns from release notes. If there are patterns, maybe we can use these patterns to identify app behaviors correlated to those patterns. </a:t>
             </a:r>
           </a:p>
         </p:txBody>
@@ -2190,7 +2377,10 @@
           <a:bodyPr/>
           <a:lstStyle/>
           <a:p>
-            <a:endParaRPr lang="en-US" dirty="0"/>
+            <a:r>
+              <a:rPr lang="en-US" dirty="0"/>
+              <a:t>To collect data, we use release notes, user reviews, and developer responses to those user reviews on  the top 2232 apps the google play store. By the end of our 3 year data collection process, we have 70 thousand release notes, 67 million user reviews, and 2.9 million developer responses. </a:t>
+            </a:r>
           </a:p>
         </p:txBody>
       </p:sp>
@@ -2273,6 +2463,30 @@
         <p:txBody>
           <a:bodyPr/>
           <a:lstStyle/>
+          <a:p>
+            <a:r>
+              <a:rPr lang="en-US" dirty="0"/>
+              <a:t>From our collected data, we ask 3 research questions.</a:t>
+            </a:r>
+          </a:p>
+          <a:p>
+            <a:r>
+              <a:rPr lang="en-US" dirty="0"/>
+              <a:t>The first question is, we want to know if apps write release notes under certain patterns. As a start to the possible types of patterns, we look at how often release notes are updated, and how much content they contain. </a:t>
+            </a:r>
+          </a:p>
+          <a:p>
+            <a:r>
+              <a:rPr lang="en-US" dirty="0"/>
+              <a:t>We then ask if apps that follow certain patterns show certain app characteristics, such as size of the app, frequency of updates, or user reviews.</a:t>
+            </a:r>
+          </a:p>
+          <a:p>
+            <a:r>
+              <a:rPr lang="en-US" dirty="0"/>
+              <a:t>Finally, assuming we can identify patterns, and those patterns do correlate with app characteristics, we aim to figure out if apps ever change their release note patterns and if that change is correlated with any app characteristics changes too.</a:t>
+            </a:r>
+          </a:p>
           <a:p>
             <a:endParaRPr lang="en-US" dirty="0"/>
           </a:p>
@@ -2461,7 +2675,7 @@
           <a:p>
             <a:fld id="{54D71D37-BE42-4C51-8961-B9AA167182C2}" type="datetime1">
               <a:rPr lang="en-US" smtClean="0"/>
-              <a:t>4/9/2022</a:t>
+              <a:t>4/14/22</a:t>
             </a:fld>
             <a:endParaRPr lang="en-US"/>
           </a:p>
@@ -2659,7 +2873,7 @@
           <a:p>
             <a:fld id="{692FD857-EF9C-4377-A29A-72B4A929BFB1}" type="datetime1">
               <a:rPr lang="en-US" smtClean="0"/>
-              <a:t>4/9/2022</a:t>
+              <a:t>4/14/22</a:t>
             </a:fld>
             <a:endParaRPr lang="en-US"/>
           </a:p>
@@ -2867,7 +3081,7 @@
           <a:p>
             <a:fld id="{566CB2E4-01B2-4784-B916-33CF5F6788E5}" type="datetime1">
               <a:rPr lang="en-US" smtClean="0"/>
-              <a:t>4/9/2022</a:t>
+              <a:t>4/14/22</a:t>
             </a:fld>
             <a:endParaRPr lang="en-US"/>
           </a:p>
@@ -3103,7 +3317,7 @@
           <a:p>
             <a:fld id="{212C6BE7-9C3B-4806-9271-F8E78CB16BCD}" type="datetime1">
               <a:rPr lang="en-US" smtClean="0"/>
-              <a:t>4/9/2022</a:t>
+              <a:t>4/14/22</a:t>
             </a:fld>
             <a:endParaRPr lang="en-US"/>
           </a:p>
@@ -3378,7 +3592,7 @@
           <a:p>
             <a:fld id="{B77B076C-C7C2-43D5-83A0-702B2B503D3A}" type="datetime1">
               <a:rPr lang="en-US" smtClean="0"/>
-              <a:t>4/9/2022</a:t>
+              <a:t>4/14/22</a:t>
             </a:fld>
             <a:endParaRPr lang="en-US"/>
           </a:p>
@@ -3724,7 +3938,7 @@
             <a:fld id="{E1EB4593-7B6D-421D-8A6C-EEBB90132B40}" type="datetime1">
               <a:rPr lang="en-US" smtClean="0"/>
               <a:pPr/>
-              <a:t>4/9/2022</a:t>
+              <a:t>4/14/22</a:t>
             </a:fld>
             <a:endParaRPr lang="en-US"/>
           </a:p>
@@ -4151,7 +4365,7 @@
           <a:p>
             <a:fld id="{AC891ECA-9016-46A2-BCCF-52CCF30F3C3F}" type="datetime1">
               <a:rPr lang="en-US" smtClean="0"/>
-              <a:t>4/9/2022</a:t>
+              <a:t>4/14/22</a:t>
             </a:fld>
             <a:endParaRPr lang="en-US"/>
           </a:p>
@@ -4292,7 +4506,7 @@
           <a:p>
             <a:fld id="{745F822E-6754-4396-A549-C203647D2807}" type="datetime1">
               <a:rPr lang="en-US" smtClean="0"/>
-              <a:t>4/9/2022</a:t>
+              <a:t>4/14/22</a:t>
             </a:fld>
             <a:endParaRPr lang="en-US"/>
           </a:p>
@@ -4405,7 +4619,7 @@
           <a:p>
             <a:fld id="{0B7C82E4-F2CD-41BB-9139-5029F2805B89}" type="datetime1">
               <a:rPr lang="en-US" smtClean="0"/>
-              <a:t>4/9/2022</a:t>
+              <a:t>4/14/22</a:t>
             </a:fld>
             <a:endParaRPr lang="en-US"/>
           </a:p>
@@ -4716,7 +4930,7 @@
           <a:p>
             <a:fld id="{13C9C19A-62F3-4FAE-88A7-622836A2CC7E}" type="datetime1">
               <a:rPr lang="en-US" smtClean="0"/>
-              <a:t>4/9/2022</a:t>
+              <a:t>4/14/22</a:t>
             </a:fld>
             <a:endParaRPr lang="en-US"/>
           </a:p>
@@ -5004,7 +5218,7 @@
           <a:p>
             <a:fld id="{9CBFB8D4-8067-4C4E-A4D8-A060ACCA2426}" type="datetime1">
               <a:rPr lang="en-US" smtClean="0"/>
-              <a:t>4/9/2022</a:t>
+              <a:t>4/14/22</a:t>
             </a:fld>
             <a:endParaRPr lang="en-US"/>
           </a:p>
@@ -5245,7 +5459,7 @@
           <a:p>
             <a:fld id="{2EDDBF34-CBA6-4FE1-B1DA-75020C6AFCC8}" type="datetime1">
               <a:rPr lang="en-US" smtClean="0"/>
-              <a:t>4/9/2022</a:t>
+              <a:t>4/14/22</a:t>
             </a:fld>
             <a:endParaRPr lang="en-US"/>
           </a:p>
@@ -6362,8 +6576,8 @@
         </p:blipFill>
         <p:spPr>
           <a:xfrm>
-            <a:off x="862804" y="1857362"/>
-            <a:ext cx="4199169" cy="4003040"/>
+            <a:off x="666276" y="1537041"/>
+            <a:ext cx="4871198" cy="4643681"/>
           </a:xfrm>
           <a:prstGeom prst="rect">
             <a:avLst/>
@@ -10919,7 +11133,7 @@
                   <a:srgbClr val="C00000"/>
                 </a:solidFill>
               </a:rPr>
-              <a:t>We Surveyed 102 Developers</a:t>
+              <a:t>Are release notes important to you? How so?</a:t>
             </a:r>
             <a:endParaRPr lang="en-US" sz="4000" dirty="0"/>
           </a:p>
@@ -11425,7 +11639,7 @@
         <p:spPr>
           <a:xfrm>
             <a:off x="496185" y="1601972"/>
-            <a:ext cx="10262763" cy="2916688"/>
+            <a:ext cx="10262763" cy="1827028"/>
           </a:xfrm>
         </p:spPr>
         <p:txBody>
@@ -11435,11 +11649,11 @@
           <a:lstStyle/>
           <a:p>
             <a:r>
-              <a:rPr lang="en-US" sz="2800" dirty="0"/>
+              <a:rPr lang="en-US" sz="3200" dirty="0"/>
               <a:t>We collected data of the studied </a:t>
             </a:r>
             <a:r>
-              <a:rPr lang="en-US" sz="2800" dirty="0">
+              <a:rPr lang="en-US" sz="3200" dirty="0">
                 <a:solidFill>
                   <a:srgbClr val="C00000"/>
                 </a:solidFill>
@@ -11447,29 +11661,22 @@
               <a:t>2,232</a:t>
             </a:r>
             <a:r>
-              <a:rPr lang="en-US" sz="2800" dirty="0"/>
-              <a:t> apps over the period of three years </a:t>
-            </a:r>
-            <a:br>
-              <a:rPr lang="en-US" sz="2800" dirty="0"/>
-            </a:br>
-            <a:r>
-              <a:rPr lang="en-US" sz="2800" dirty="0"/>
-              <a:t>(</a:t>
-            </a:r>
-            <a:r>
-              <a:rPr lang="en-US" sz="2800" dirty="0">
+              <a:rPr lang="en-US" sz="3200" dirty="0"/>
+              <a:t> apps over the period of three years  (</a:t>
+            </a:r>
+            <a:r>
+              <a:rPr lang="en-US" sz="3200" dirty="0">
                 <a:effectLst/>
               </a:rPr>
               <a:t>April 2016 - April 2019)</a:t>
             </a:r>
             <a:br>
-              <a:rPr lang="en-US" sz="2800" dirty="0"/>
+              <a:rPr lang="en-US" sz="3200" dirty="0"/>
             </a:br>
             <a:br>
-              <a:rPr lang="en-US" sz="2800" dirty="0"/>
+              <a:rPr lang="en-US" sz="3200" dirty="0"/>
             </a:br>
-            <a:endParaRPr lang="en-US" sz="2800" dirty="0"/>
+            <a:endParaRPr lang="en-US" sz="3200" dirty="0"/>
           </a:p>
         </p:txBody>
       </p:sp>
@@ -11821,7 +12028,7 @@
         <p:spPr>
           <a:xfrm>
             <a:off x="838200" y="1825625"/>
-            <a:ext cx="11023242" cy="4351338"/>
+            <a:ext cx="11023242" cy="3804210"/>
           </a:xfrm>
         </p:spPr>
         <p:txBody>
@@ -11867,7 +12074,6 @@
           <a:p>
             <a:r>
               <a:rPr lang="en-US" sz="3600" dirty="0">
-                <a:effectLst/>
                 <a:latin typeface="Arial" panose="020B0604020202020204" pitchFamily="34" charset="0"/>
               </a:rPr>
               <a:t>RQ2: What are the </a:t>
@@ -11877,21 +12083,16 @@
                 <a:solidFill>
                   <a:srgbClr val="C00000"/>
                 </a:solidFill>
-                <a:effectLst/>
                 <a:latin typeface="Arial" panose="020B0604020202020204" pitchFamily="34" charset="0"/>
               </a:rPr>
               <a:t>characteristics</a:t>
             </a:r>
             <a:r>
               <a:rPr lang="en-US" sz="3600" dirty="0">
-                <a:effectLst/>
                 <a:latin typeface="Arial" panose="020B0604020202020204" pitchFamily="34" charset="0"/>
               </a:rPr>
               <a:t> of the apps that follow a certain release notes pattern?</a:t>
             </a:r>
-            <a:endParaRPr lang="en-US" sz="3600" dirty="0">
-              <a:latin typeface="Arial" panose="020B0604020202020204" pitchFamily="34" charset="0"/>
-            </a:endParaRPr>
           </a:p>
           <a:p>
             <a:pPr marL="0" indent="0">
@@ -11904,38 +12105,20 @@
           <a:p>
             <a:r>
               <a:rPr lang="en-US" sz="3600" dirty="0">
-                <a:effectLst/>
                 <a:latin typeface="Arial" panose="020B0604020202020204" pitchFamily="34" charset="0"/>
               </a:rPr>
-              <a:t>RQ3: </a:t>
-            </a:r>
-            <a:r>
-              <a:rPr lang="en-US" sz="3600" dirty="0">
-                <a:latin typeface="Arial" panose="020B0604020202020204" pitchFamily="34" charset="0"/>
-              </a:rPr>
-              <a:t>Do </a:t>
-            </a:r>
-            <a:r>
-              <a:rPr lang="en-US" sz="3600" dirty="0">
-                <a:effectLst/>
-                <a:latin typeface="Arial" panose="020B0604020202020204" pitchFamily="34" charset="0"/>
-              </a:rPr>
-              <a:t>developers ever </a:t>
-            </a:r>
-            <a:r>
-              <a:rPr lang="en-US" sz="3600" dirty="0">
-                <a:latin typeface="Arial" panose="020B0604020202020204" pitchFamily="34" charset="0"/>
-              </a:rPr>
-              <a:t>change</a:t>
-            </a:r>
-            <a:r>
-              <a:rPr lang="en-US" sz="3600" dirty="0">
-                <a:effectLst/>
-                <a:latin typeface="Arial" panose="020B0604020202020204" pitchFamily="34" charset="0"/>
-              </a:rPr>
-              <a:t> their release notes pattern? </a:t>
+              <a:t>RQ3: Do developers ever change their release notes pattern? </a:t>
             </a:r>
             <a:endParaRPr lang="en-US" sz="3600" dirty="0"/>
+          </a:p>
+          <a:p>
+            <a:pPr marL="0" indent="0">
+              <a:buNone/>
+            </a:pPr>
+            <a:endParaRPr lang="en-US" sz="3600" dirty="0">
+              <a:effectLst/>
+              <a:latin typeface="Arial" panose="020B0604020202020204" pitchFamily="34" charset="0"/>
+            </a:endParaRPr>
           </a:p>
         </p:txBody>
       </p:sp>

</xml_diff>

<commit_message>
add comments finished pres
</commit_message>
<xml_diff>
--- a/files/icse22.pptx
+++ b/files/icse22.pptx
@@ -227,7 +227,7 @@
           <a:p>
             <a:fld id="{7765B7B4-1140-426D-80C7-5C3DF0ADCEB4}" type="datetimeFigureOut">
               <a:rPr lang="en-US" smtClean="0"/>
-              <a:t>4/14/22</a:t>
+              <a:t>4/15/2022</a:t>
             </a:fld>
             <a:endParaRPr lang="en-US"/>
           </a:p>
@@ -584,6 +584,31 @@
           <a:p>
             <a:r>
               <a:rPr lang="en-US" dirty="0"/>
+              <a:t>I want to thank you for being here watching my presentation, and I also want to thank my collaborators and mentors: Safwat Hassan at Thompson rivers university, Ying </a:t>
+            </a:r>
+            <a:r>
+              <a:rPr lang="en-US" dirty="0" err="1"/>
+              <a:t>zou</a:t>
+            </a:r>
+            <a:r>
+              <a:rPr lang="en-US" dirty="0"/>
+              <a:t>, at queen’s university, and </a:t>
+            </a:r>
+            <a:r>
+              <a:rPr lang="en-US" dirty="0" err="1"/>
+              <a:t>ahmed</a:t>
+            </a:r>
+            <a:r>
+              <a:rPr lang="en-US" dirty="0"/>
+              <a:t> e Hassan at queens university</a:t>
+            </a:r>
+          </a:p>
+          <a:p>
+            <a:endParaRPr lang="en-US" dirty="0"/>
+          </a:p>
+          <a:p>
+            <a:r>
+              <a:rPr lang="en-US" dirty="0"/>
               <a:t>The main motivation behind this paper is that developers on app stores write a release note at every update of their app, and prior to this work, no one has done an empirical, longitudinal study on release notes. </a:t>
             </a:r>
           </a:p>
@@ -1203,13 +1228,7 @@
           <a:p>
             <a:r>
               <a:rPr lang="en-US" dirty="0"/>
-              <a:t>what is correlated with a shift in release notes. we wanted to formalize and learn about the apps. </a:t>
-            </a:r>
-          </a:p>
-          <a:p>
-            <a:r>
-              <a:rPr lang="en-US" dirty="0"/>
-              <a:t>we took a natural science approach to see if release patterns change at all. we observe they follow different patterns and have characteristics. </a:t>
+              <a:t>We now have a sense of the major release note patterns, and how they are related to app features. However, since developers and app teams change due to various reasons, we cannot assume that they always write release notes the same way. we next try to see what is correlated with a shift in release notes. we wanted to formalize and learn about the apps that show a shift in release notes. </a:t>
             </a:r>
           </a:p>
         </p:txBody>
@@ -1299,7 +1318,7 @@
           <a:p>
             <a:r>
               <a:rPr lang="en-US" dirty="0"/>
-              <a:t>we study how much a release note pattern changes based on time series analysis</a:t>
+              <a:t>we study how much a release note pattern changes based on time series analysis. For each clustering metric, if an app shows a statistically significant change in relation to time, we call the app non-stationary, and hence shifting patterns. </a:t>
             </a:r>
           </a:p>
         </p:txBody>
@@ -1386,7 +1405,13 @@
           <a:p>
             <a:r>
               <a:rPr lang="en-US" dirty="0"/>
-              <a:t>We observe that 92% of the identified shifts are either from short to long or non-updating to updating release notes. As you can see from the figure on the right, 16 of the 54 shifting apps go from using short non-updating release notes to long and updating release notes. </a:t>
+              <a:t>Of our dataset, we observe that 54 apps have shifting release note patterns. </a:t>
+            </a:r>
+          </a:p>
+          <a:p>
+            <a:r>
+              <a:rPr lang="en-US" dirty="0"/>
+              <a:t>We find that 92% of the identified shifts are either from short to long or non-updating to updating release notes. As you can see from the figure on the right, 16 of the 54 shifting apps go from using short non-updating release notes to long and updating release notes. </a:t>
             </a:r>
           </a:p>
         </p:txBody>
@@ -1613,7 +1638,15 @@
           <a:p>
             <a:r>
               <a:rPr lang="en-US" dirty="0"/>
-              <a:t>To summarize this talk, we found that release notes are imperfect, and users often write negative reviews because of them. We use a developer survey study as well as a quantitative study on 3 years of google play store data to find out how release notes are written and how they can be improved. To the best of our knowledge, our work is the first to include both a qualitative study and a longitudinal study on 3 years worth of release note date. Our main contributions are the 6 identified release note patterns, and the classification model identified app characteristics correlated to these patterns. In particular, we find that apps that write long and updating release notes often have higher perceive releases, and apps that shift into writing more informative release notes often observe an increase in user ratings. </a:t>
+              <a:t>To summarize this talk, we found that release notes are imperfect, and users often write negative reviews because of them. We use a developer survey study as well as a quantitative study on 3 years of google play store data to find out how release notes are written and how they can be improved. To the best of our knowledge, our work is the first to include both a qualitative study and a longitudinal study on </a:t>
+            </a:r>
+            <a:r>
+              <a:rPr lang="en-US"/>
+              <a:t>release notes. </a:t>
+            </a:r>
+            <a:r>
+              <a:rPr lang="en-US" dirty="0"/>
+              <a:t>Our main contributions are the 6 identified release note patterns, and the classification model identified app characteristics correlated to these patterns. In particular, we find that apps that write long and updating release notes often have higher perceive releases, and apps that shift into writing more informative release notes often observe an increase in user ratings. </a:t>
             </a:r>
           </a:p>
         </p:txBody>
@@ -1981,7 +2014,15 @@
           <a:p>
             <a:r>
               <a:rPr lang="en-US" dirty="0"/>
-              <a:t>Now I want to ask if developers really care about release notes. We sent out survey invitations on multiple discuss platforms for app developers, and asked them questions about how they write release notes.</a:t>
+              <a:t>Now I want to ask if developers really care about release notes. We sent out survey invitations on multiple discussions platforms for app developers, and asked them questions about how they write release notes. For example, we created posts on app dev subreddits, and on a </a:t>
+            </a:r>
+            <a:r>
+              <a:rPr lang="en-US" dirty="0" err="1"/>
+              <a:t>qa</a:t>
+            </a:r>
+            <a:r>
+              <a:rPr lang="en-US" dirty="0"/>
+              <a:t> site called f-droid.org. </a:t>
             </a:r>
           </a:p>
         </p:txBody>
@@ -2675,7 +2716,7 @@
           <a:p>
             <a:fld id="{54D71D37-BE42-4C51-8961-B9AA167182C2}" type="datetime1">
               <a:rPr lang="en-US" smtClean="0"/>
-              <a:t>4/14/22</a:t>
+              <a:t>4/15/2022</a:t>
             </a:fld>
             <a:endParaRPr lang="en-US"/>
           </a:p>
@@ -2873,7 +2914,7 @@
           <a:p>
             <a:fld id="{692FD857-EF9C-4377-A29A-72B4A929BFB1}" type="datetime1">
               <a:rPr lang="en-US" smtClean="0"/>
-              <a:t>4/14/22</a:t>
+              <a:t>4/15/2022</a:t>
             </a:fld>
             <a:endParaRPr lang="en-US"/>
           </a:p>
@@ -3081,7 +3122,7 @@
           <a:p>
             <a:fld id="{566CB2E4-01B2-4784-B916-33CF5F6788E5}" type="datetime1">
               <a:rPr lang="en-US" smtClean="0"/>
-              <a:t>4/14/22</a:t>
+              <a:t>4/15/2022</a:t>
             </a:fld>
             <a:endParaRPr lang="en-US"/>
           </a:p>
@@ -3317,7 +3358,7 @@
           <a:p>
             <a:fld id="{212C6BE7-9C3B-4806-9271-F8E78CB16BCD}" type="datetime1">
               <a:rPr lang="en-US" smtClean="0"/>
-              <a:t>4/14/22</a:t>
+              <a:t>4/15/2022</a:t>
             </a:fld>
             <a:endParaRPr lang="en-US"/>
           </a:p>
@@ -3592,7 +3633,7 @@
           <a:p>
             <a:fld id="{B77B076C-C7C2-43D5-83A0-702B2B503D3A}" type="datetime1">
               <a:rPr lang="en-US" smtClean="0"/>
-              <a:t>4/14/22</a:t>
+              <a:t>4/15/2022</a:t>
             </a:fld>
             <a:endParaRPr lang="en-US"/>
           </a:p>
@@ -3938,7 +3979,7 @@
             <a:fld id="{E1EB4593-7B6D-421D-8A6C-EEBB90132B40}" type="datetime1">
               <a:rPr lang="en-US" smtClean="0"/>
               <a:pPr/>
-              <a:t>4/14/22</a:t>
+              <a:t>4/15/2022</a:t>
             </a:fld>
             <a:endParaRPr lang="en-US"/>
           </a:p>
@@ -4365,7 +4406,7 @@
           <a:p>
             <a:fld id="{AC891ECA-9016-46A2-BCCF-52CCF30F3C3F}" type="datetime1">
               <a:rPr lang="en-US" smtClean="0"/>
-              <a:t>4/14/22</a:t>
+              <a:t>4/15/2022</a:t>
             </a:fld>
             <a:endParaRPr lang="en-US"/>
           </a:p>
@@ -4506,7 +4547,7 @@
           <a:p>
             <a:fld id="{745F822E-6754-4396-A549-C203647D2807}" type="datetime1">
               <a:rPr lang="en-US" smtClean="0"/>
-              <a:t>4/14/22</a:t>
+              <a:t>4/15/2022</a:t>
             </a:fld>
             <a:endParaRPr lang="en-US"/>
           </a:p>
@@ -4619,7 +4660,7 @@
           <a:p>
             <a:fld id="{0B7C82E4-F2CD-41BB-9139-5029F2805B89}" type="datetime1">
               <a:rPr lang="en-US" smtClean="0"/>
-              <a:t>4/14/22</a:t>
+              <a:t>4/15/2022</a:t>
             </a:fld>
             <a:endParaRPr lang="en-US"/>
           </a:p>
@@ -4930,7 +4971,7 @@
           <a:p>
             <a:fld id="{13C9C19A-62F3-4FAE-88A7-622836A2CC7E}" type="datetime1">
               <a:rPr lang="en-US" smtClean="0"/>
-              <a:t>4/14/22</a:t>
+              <a:t>4/15/2022</a:t>
             </a:fld>
             <a:endParaRPr lang="en-US"/>
           </a:p>
@@ -5218,7 +5259,7 @@
           <a:p>
             <a:fld id="{9CBFB8D4-8067-4C4E-A4D8-A060ACCA2426}" type="datetime1">
               <a:rPr lang="en-US" smtClean="0"/>
-              <a:t>4/14/22</a:t>
+              <a:t>4/15/2022</a:t>
             </a:fld>
             <a:endParaRPr lang="en-US"/>
           </a:p>
@@ -5459,7 +5500,7 @@
           <a:p>
             <a:fld id="{2EDDBF34-CBA6-4FE1-B1DA-75020C6AFCC8}" type="datetime1">
               <a:rPr lang="en-US" smtClean="0"/>
-              <a:t>4/14/22</a:t>
+              <a:t>4/15/2022</a:t>
             </a:fld>
             <a:endParaRPr lang="en-US"/>
           </a:p>
@@ -5895,8 +5936,8 @@
         </p:nvSpPr>
         <p:spPr>
           <a:xfrm>
-            <a:off x="838200" y="268533"/>
-            <a:ext cx="9934977" cy="3485658"/>
+            <a:off x="486508" y="463709"/>
+            <a:ext cx="11353800" cy="3485658"/>
           </a:xfrm>
         </p:spPr>
         <p:txBody>
@@ -5942,7 +5983,7 @@
         </p:nvSpPr>
         <p:spPr>
           <a:xfrm>
-            <a:off x="838200" y="3309869"/>
+            <a:off x="486508" y="3177007"/>
             <a:ext cx="10515600" cy="2867093"/>
           </a:xfrm>
         </p:spPr>
@@ -6050,7 +6091,7 @@
         </p:blipFill>
         <p:spPr>
           <a:xfrm>
-            <a:off x="3822245" y="4278147"/>
+            <a:off x="3603414" y="4278146"/>
             <a:ext cx="3449800" cy="1374859"/>
           </a:xfrm>
           <a:prstGeom prst="rect">
@@ -6080,7 +6121,7 @@
         </p:blipFill>
         <p:spPr>
           <a:xfrm>
-            <a:off x="1051448" y="4039061"/>
+            <a:off x="613786" y="4039061"/>
             <a:ext cx="2557549" cy="1853030"/>
           </a:xfrm>
           <a:prstGeom prst="rect">
@@ -8220,7 +8261,7 @@
                 </a:solidFill>
                 <a:effectLst/>
               </a:rPr>
-              <a:t>stationarity</a:t>
+              <a:t>stationary</a:t>
             </a:r>
             <a:endParaRPr lang="en-US" dirty="0">
               <a:solidFill>
@@ -11155,8 +11196,8 @@
         </p:nvSpPr>
         <p:spPr>
           <a:xfrm>
-            <a:off x="1863718" y="1656192"/>
-            <a:ext cx="4302642" cy="1530876"/>
+            <a:off x="1222855" y="1812181"/>
+            <a:ext cx="9490083" cy="560900"/>
           </a:xfrm>
           <a:prstGeom prst="rect">
             <a:avLst/>
@@ -11164,7 +11205,7 @@
         </p:spPr>
         <p:txBody>
           <a:bodyPr vert="horz" lIns="91440" tIns="45720" rIns="91440" bIns="45720" rtlCol="0" anchor="t">
-            <a:normAutofit/>
+            <a:noAutofit/>
           </a:bodyPr>
           <a:lstStyle>
             <a:lvl1pPr marL="228600" indent="-228600" algn="l" defTabSz="914400" rtl="0" eaLnBrk="1" latinLnBrk="0" hangingPunct="1">
@@ -11331,12 +11372,9 @@
             </a:lvl9pPr>
           </a:lstStyle>
           <a:p>
-            <a:pPr marL="0" indent="0">
-              <a:buNone/>
-            </a:pPr>
             <a:r>
               <a:rPr lang="en-US" sz="2400" b="0" i="0" u="none" strike="noStrike" baseline="0" dirty="0"/>
-              <a:t>67% </a:t>
+              <a:t>  67% </a:t>
             </a:r>
             <a:r>
               <a:rPr lang="en-US" sz="2400" dirty="0"/>
@@ -11350,36 +11388,155 @@
           </a:p>
         </p:txBody>
       </p:sp>
-      <p:pic>
-        <p:nvPicPr>
-          <p:cNvPr id="15" name="Picture 14">
-            <a:extLst>
-              <a:ext uri="{FF2B5EF4-FFF2-40B4-BE49-F238E27FC236}">
-                <a16:creationId xmlns:a16="http://schemas.microsoft.com/office/drawing/2014/main" id="{2D0E2E28-7533-4E51-ACC5-F7481B7E96A3}"/>
-              </a:ext>
-            </a:extLst>
-          </p:cNvPr>
-          <p:cNvPicPr>
-            <a:picLocks noChangeAspect="1"/>
-          </p:cNvPicPr>
+      <p:sp>
+        <p:nvSpPr>
+          <p:cNvPr id="7" name="TextBox 6">
+            <a:extLst>
+              <a:ext uri="{FF2B5EF4-FFF2-40B4-BE49-F238E27FC236}">
+                <a16:creationId xmlns:a16="http://schemas.microsoft.com/office/drawing/2014/main" id="{C5E07523-BF17-4E1F-BAE2-B0FF173D306D}"/>
+              </a:ext>
+            </a:extLst>
+          </p:cNvPr>
+          <p:cNvSpPr txBox="1"/>
           <p:nvPr/>
-        </p:nvPicPr>
-        <p:blipFill>
-          <a:blip r:embed="rId3"/>
-          <a:stretch>
-            <a:fillRect/>
-          </a:stretch>
-        </p:blipFill>
+        </p:nvSpPr>
         <p:spPr>
           <a:xfrm>
-            <a:off x="2572270" y="3073850"/>
-            <a:ext cx="6183110" cy="3030223"/>
+            <a:off x="1222855" y="2669960"/>
+            <a:ext cx="9015298" cy="830997"/>
           </a:xfrm>
           <a:prstGeom prst="rect">
             <a:avLst/>
           </a:prstGeom>
+          <a:noFill/>
         </p:spPr>
-      </p:pic>
+        <p:txBody>
+          <a:bodyPr wrap="square">
+            <a:spAutoFit/>
+          </a:bodyPr>
+          <a:lstStyle/>
+          <a:p>
+            <a:pPr marL="342900" indent="-342900">
+              <a:buFont typeface="Arial" panose="020B0604020202020204" pitchFamily="34" charset="0"/>
+              <a:buChar char="•"/>
+            </a:pPr>
+            <a:r>
+              <a:rPr lang="en-US" sz="2400" dirty="0">
+                <a:latin typeface="Calibri" panose="020F0502020204030204" pitchFamily="34" charset="0"/>
+                <a:cs typeface="Calibri" panose="020F0502020204030204" pitchFamily="34" charset="0"/>
+              </a:rPr>
+              <a:t>78% of them would like a tool to help them generate release notes</a:t>
+            </a:r>
+            <a:br>
+              <a:rPr lang="en-US" sz="2400" dirty="0">
+                <a:latin typeface="Calibri" panose="020F0502020204030204" pitchFamily="34" charset="0"/>
+                <a:cs typeface="Calibri" panose="020F0502020204030204" pitchFamily="34" charset="0"/>
+              </a:rPr>
+            </a:br>
+            <a:endParaRPr lang="en-US" sz="2400" dirty="0">
+              <a:latin typeface="Calibri" panose="020F0502020204030204" pitchFamily="34" charset="0"/>
+              <a:cs typeface="Calibri" panose="020F0502020204030204" pitchFamily="34" charset="0"/>
+            </a:endParaRPr>
+          </a:p>
+        </p:txBody>
+      </p:sp>
+      <p:sp>
+        <p:nvSpPr>
+          <p:cNvPr id="10" name="TextBox 9">
+            <a:extLst>
+              <a:ext uri="{FF2B5EF4-FFF2-40B4-BE49-F238E27FC236}">
+                <a16:creationId xmlns:a16="http://schemas.microsoft.com/office/drawing/2014/main" id="{E67994B9-336D-4C0D-9AE9-E4D9ECB8E8F7}"/>
+              </a:ext>
+            </a:extLst>
+          </p:cNvPr>
+          <p:cNvSpPr txBox="1"/>
+          <p:nvPr/>
+        </p:nvSpPr>
+        <p:spPr>
+          <a:xfrm>
+            <a:off x="1222855" y="3870289"/>
+            <a:ext cx="9921883" cy="461665"/>
+          </a:xfrm>
+          <a:prstGeom prst="rect">
+            <a:avLst/>
+          </a:prstGeom>
+          <a:noFill/>
+        </p:spPr>
+        <p:txBody>
+          <a:bodyPr wrap="square">
+            <a:spAutoFit/>
+          </a:bodyPr>
+          <a:lstStyle/>
+          <a:p>
+            <a:pPr marL="342900" marR="0" lvl="0" indent="-342900" algn="l" defTabSz="914400" rtl="0" eaLnBrk="1" fontAlgn="auto" latinLnBrk="0" hangingPunct="1">
+              <a:lnSpc>
+                <a:spcPct val="100000"/>
+              </a:lnSpc>
+              <a:spcBef>
+                <a:spcPts val="0"/>
+              </a:spcBef>
+              <a:spcAft>
+                <a:spcPts val="0"/>
+              </a:spcAft>
+              <a:buClrTx/>
+              <a:buSzTx/>
+              <a:buFont typeface="Arial" panose="020B0604020202020204" pitchFamily="34" charset="0"/>
+              <a:buChar char="•"/>
+              <a:tabLst/>
+              <a:defRPr/>
+            </a:pPr>
+            <a:r>
+              <a:rPr lang="en-US" sz="2400" dirty="0">
+                <a:latin typeface="Calibri" panose="020F0502020204030204" pitchFamily="34" charset="0"/>
+                <a:cs typeface="Calibri" panose="020F0502020204030204" pitchFamily="34" charset="0"/>
+              </a:rPr>
+              <a:t>83% of the developers say that release notes can directly respond to users</a:t>
+            </a:r>
+          </a:p>
+        </p:txBody>
+      </p:sp>
+      <p:sp>
+        <p:nvSpPr>
+          <p:cNvPr id="11" name="TextBox 10">
+            <a:extLst>
+              <a:ext uri="{FF2B5EF4-FFF2-40B4-BE49-F238E27FC236}">
+                <a16:creationId xmlns:a16="http://schemas.microsoft.com/office/drawing/2014/main" id="{A177B743-AFAD-458B-9F01-C74B85F116FD}"/>
+              </a:ext>
+            </a:extLst>
+          </p:cNvPr>
+          <p:cNvSpPr txBox="1"/>
+          <p:nvPr/>
+        </p:nvSpPr>
+        <p:spPr>
+          <a:xfrm>
+            <a:off x="1222855" y="4962211"/>
+            <a:ext cx="9921883" cy="830997"/>
+          </a:xfrm>
+          <a:prstGeom prst="rect">
+            <a:avLst/>
+          </a:prstGeom>
+          <a:noFill/>
+        </p:spPr>
+        <p:txBody>
+          <a:bodyPr wrap="square">
+            <a:spAutoFit/>
+          </a:bodyPr>
+          <a:lstStyle/>
+          <a:p>
+            <a:pPr marL="342900" indent="-342900">
+              <a:buFont typeface="Arial" panose="020B0604020202020204" pitchFamily="34" charset="0"/>
+              <a:buChar char="•"/>
+            </a:pPr>
+            <a:r>
+              <a:rPr lang="en-US" sz="2400" dirty="0">
+                <a:latin typeface="Calibri" panose="020F0502020204030204" pitchFamily="34" charset="0"/>
+                <a:cs typeface="Calibri" panose="020F0502020204030204" pitchFamily="34" charset="0"/>
+              </a:rPr>
+              <a:t>90% of the developers say that they are important for notifying the userbase about recent updates to their app.</a:t>
+            </a:r>
+          </a:p>
+        </p:txBody>
+      </p:sp>
     </p:spTree>
     <p:extLst>
       <p:ext uri="{BB962C8B-B14F-4D97-AF65-F5344CB8AC3E}">
@@ -11402,9 +11559,6 @@
                     <p:cTn id="3" fill="hold">
                       <p:stCondLst>
                         <p:cond delay="indefinite"/>
-                        <p:cond evt="onBegin" delay="0">
-                          <p:tn val="2"/>
-                        </p:cond>
                       </p:stCondLst>
                       <p:childTnLst>
                         <p:par>
@@ -11414,7 +11568,7 @@
                             </p:stCondLst>
                             <p:childTnLst>
                               <p:par>
-                                <p:cTn id="5" presetID="1" presetClass="entr" presetSubtype="0" fill="hold" nodeType="withEffect">
+                                <p:cTn id="5" presetID="1" presetClass="entr" presetSubtype="0" fill="hold" grpId="0" nodeType="clickEffect">
                                   <p:stCondLst>
                                     <p:cond delay="0"/>
                                   </p:stCondLst>
@@ -11427,7 +11581,97 @@
                                           </p:stCondLst>
                                         </p:cTn>
                                         <p:tgtEl>
-                                          <p:spTgt spid="15"/>
+                                          <p:spTgt spid="7"/>
+                                        </p:tgtEl>
+                                        <p:attrNameLst>
+                                          <p:attrName>style.visibility</p:attrName>
+                                        </p:attrNameLst>
+                                      </p:cBhvr>
+                                      <p:to>
+                                        <p:strVal val="visible"/>
+                                      </p:to>
+                                    </p:set>
+                                  </p:childTnLst>
+                                </p:cTn>
+                              </p:par>
+                            </p:childTnLst>
+                          </p:cTn>
+                        </p:par>
+                      </p:childTnLst>
+                    </p:cTn>
+                  </p:par>
+                  <p:par>
+                    <p:cTn id="7" fill="hold">
+                      <p:stCondLst>
+                        <p:cond delay="indefinite"/>
+                      </p:stCondLst>
+                      <p:childTnLst>
+                        <p:par>
+                          <p:cTn id="8" fill="hold">
+                            <p:stCondLst>
+                              <p:cond delay="0"/>
+                            </p:stCondLst>
+                            <p:childTnLst>
+                              <p:par>
+                                <p:cTn id="9" presetID="1" presetClass="entr" presetSubtype="0" fill="hold" grpId="0" nodeType="clickEffect">
+                                  <p:stCondLst>
+                                    <p:cond delay="0"/>
+                                  </p:stCondLst>
+                                  <p:childTnLst>
+                                    <p:set>
+                                      <p:cBhvr>
+                                        <p:cTn id="10" dur="1" fill="hold">
+                                          <p:stCondLst>
+                                            <p:cond delay="0"/>
+                                          </p:stCondLst>
+                                        </p:cTn>
+                                        <p:tgtEl>
+                                          <p:spTgt spid="10"/>
+                                        </p:tgtEl>
+                                        <p:attrNameLst>
+                                          <p:attrName>style.visibility</p:attrName>
+                                        </p:attrNameLst>
+                                      </p:cBhvr>
+                                      <p:to>
+                                        <p:strVal val="visible"/>
+                                      </p:to>
+                                    </p:set>
+                                  </p:childTnLst>
+                                </p:cTn>
+                              </p:par>
+                            </p:childTnLst>
+                          </p:cTn>
+                        </p:par>
+                      </p:childTnLst>
+                    </p:cTn>
+                  </p:par>
+                  <p:par>
+                    <p:cTn id="11" fill="hold">
+                      <p:stCondLst>
+                        <p:cond delay="indefinite"/>
+                      </p:stCondLst>
+                      <p:childTnLst>
+                        <p:par>
+                          <p:cTn id="12" fill="hold">
+                            <p:stCondLst>
+                              <p:cond delay="0"/>
+                            </p:stCondLst>
+                            <p:childTnLst>
+                              <p:par>
+                                <p:cTn id="13" presetID="1" presetClass="entr" presetSubtype="0" fill="hold" grpId="0" nodeType="clickEffect">
+                                  <p:stCondLst>
+                                    <p:cond delay="0"/>
+                                  </p:stCondLst>
+                                  <p:childTnLst>
+                                    <p:set>
+                                      <p:cBhvr>
+                                        <p:cTn id="14" dur="1" fill="hold">
+                                          <p:stCondLst>
+                                            <p:cond delay="0"/>
+                                          </p:stCondLst>
+                                        </p:cTn>
+                                        <p:tgtEl>
+                                          <p:spTgt spid="11"/>
                                         </p:tgtEl>
                                         <p:attrNameLst>
                                           <p:attrName>style.visibility</p:attrName>
@@ -11467,6 +11711,11 @@
         </p:cTn>
       </p:par>
     </p:tnLst>
+    <p:bldLst>
+      <p:bldP spid="7" grpId="0"/>
+      <p:bldP spid="10" grpId="0"/>
+      <p:bldP spid="11" grpId="0"/>
+    </p:bldLst>
   </p:timing>
 </p:sld>
 </file>

</xml_diff>